<commit_message>
Final Changes For TechTalk
</commit_message>
<xml_diff>
--- a/PPT/BootstrapSession.pptx
+++ b/PPT/BootstrapSession.pptx
@@ -6477,7 +6477,19 @@
           <a:bodyPr/>
           <a:lstStyle/>
           <a:p>
-            <a:endParaRPr lang="en-US"/>
+            <a:r>
+              <a:rPr lang="en-US" b="1" i="1" dirty="0">
+                <a:solidFill>
+                  <a:srgbClr val="FFFF00"/>
+                </a:solidFill>
+              </a:rPr>
+              <a:t>https://github.com/ImSraone/Bootstrap</a:t>
+            </a:r>
+            <a:endParaRPr lang="en-US" b="1" i="1" dirty="0">
+              <a:solidFill>
+                <a:srgbClr val="FFFF00"/>
+              </a:solidFill>
+            </a:endParaRPr>
           </a:p>
         </p:txBody>
       </p:sp>
@@ -6506,7 +6518,7 @@
         </p:blipFill>
         <p:spPr bwMode="auto">
           <a:xfrm>
-            <a:off x="2921000" y="1720850"/>
+            <a:off x="2589212" y="1371600"/>
             <a:ext cx="6350000" cy="4254500"/>
           </a:xfrm>
           <a:prstGeom prst="rect">

</xml_diff>